<commit_message>
updates to table design
</commit_message>
<xml_diff>
--- a/Table design.pptx
+++ b/Table design.pptx
@@ -105,6 +105,11 @@
       </a:defRPr>
     </a:lvl9pPr>
   </p:defaultTextStyle>
+  <p:extLst>
+    <p:ext uri="{EFAFB233-063F-42B5-8137-9DF3F51BA10A}">
+      <p15:sldGuideLst xmlns:p15="http://schemas.microsoft.com/office/powerpoint/2012/main"/>
+    </p:ext>
+  </p:extLst>
 </p:presentation>
 </file>
 

</xml_diff>

<commit_message>
added id to NewPizza and updated powerpoint
</commit_message>
<xml_diff>
--- a/Table design.pptx
+++ b/Table design.pptx
@@ -260,7 +260,7 @@
           <a:p>
             <a:fld id="{C232E424-9F19-428C-A7B9-071E7255E85E}" type="datetimeFigureOut">
               <a:rPr lang="en-US" smtClean="0"/>
-              <a:t>5/12/2020</a:t>
+              <a:t>5/26/2020</a:t>
             </a:fld>
             <a:endParaRPr lang="en-US"/>
           </a:p>
@@ -458,7 +458,7 @@
           <a:p>
             <a:fld id="{C232E424-9F19-428C-A7B9-071E7255E85E}" type="datetimeFigureOut">
               <a:rPr lang="en-US" smtClean="0"/>
-              <a:t>5/12/2020</a:t>
+              <a:t>5/26/2020</a:t>
             </a:fld>
             <a:endParaRPr lang="en-US"/>
           </a:p>
@@ -666,7 +666,7 @@
           <a:p>
             <a:fld id="{C232E424-9F19-428C-A7B9-071E7255E85E}" type="datetimeFigureOut">
               <a:rPr lang="en-US" smtClean="0"/>
-              <a:t>5/12/2020</a:t>
+              <a:t>5/26/2020</a:t>
             </a:fld>
             <a:endParaRPr lang="en-US"/>
           </a:p>
@@ -864,7 +864,7 @@
           <a:p>
             <a:fld id="{C232E424-9F19-428C-A7B9-071E7255E85E}" type="datetimeFigureOut">
               <a:rPr lang="en-US" smtClean="0"/>
-              <a:t>5/12/2020</a:t>
+              <a:t>5/26/2020</a:t>
             </a:fld>
             <a:endParaRPr lang="en-US"/>
           </a:p>
@@ -1139,7 +1139,7 @@
           <a:p>
             <a:fld id="{C232E424-9F19-428C-A7B9-071E7255E85E}" type="datetimeFigureOut">
               <a:rPr lang="en-US" smtClean="0"/>
-              <a:t>5/12/2020</a:t>
+              <a:t>5/26/2020</a:t>
             </a:fld>
             <a:endParaRPr lang="en-US"/>
           </a:p>
@@ -1404,7 +1404,7 @@
           <a:p>
             <a:fld id="{C232E424-9F19-428C-A7B9-071E7255E85E}" type="datetimeFigureOut">
               <a:rPr lang="en-US" smtClean="0"/>
-              <a:t>5/12/2020</a:t>
+              <a:t>5/26/2020</a:t>
             </a:fld>
             <a:endParaRPr lang="en-US"/>
           </a:p>
@@ -1816,7 +1816,7 @@
           <a:p>
             <a:fld id="{C232E424-9F19-428C-A7B9-071E7255E85E}" type="datetimeFigureOut">
               <a:rPr lang="en-US" smtClean="0"/>
-              <a:t>5/12/2020</a:t>
+              <a:t>5/26/2020</a:t>
             </a:fld>
             <a:endParaRPr lang="en-US"/>
           </a:p>
@@ -1957,7 +1957,7 @@
           <a:p>
             <a:fld id="{C232E424-9F19-428C-A7B9-071E7255E85E}" type="datetimeFigureOut">
               <a:rPr lang="en-US" smtClean="0"/>
-              <a:t>5/12/2020</a:t>
+              <a:t>5/26/2020</a:t>
             </a:fld>
             <a:endParaRPr lang="en-US"/>
           </a:p>
@@ -2070,7 +2070,7 @@
           <a:p>
             <a:fld id="{C232E424-9F19-428C-A7B9-071E7255E85E}" type="datetimeFigureOut">
               <a:rPr lang="en-US" smtClean="0"/>
-              <a:t>5/12/2020</a:t>
+              <a:t>5/26/2020</a:t>
             </a:fld>
             <a:endParaRPr lang="en-US"/>
           </a:p>
@@ -2381,7 +2381,7 @@
           <a:p>
             <a:fld id="{C232E424-9F19-428C-A7B9-071E7255E85E}" type="datetimeFigureOut">
               <a:rPr lang="en-US" smtClean="0"/>
-              <a:t>5/12/2020</a:t>
+              <a:t>5/26/2020</a:t>
             </a:fld>
             <a:endParaRPr lang="en-US"/>
           </a:p>
@@ -2669,7 +2669,7 @@
           <a:p>
             <a:fld id="{C232E424-9F19-428C-A7B9-071E7255E85E}" type="datetimeFigureOut">
               <a:rPr lang="en-US" smtClean="0"/>
-              <a:t>5/12/2020</a:t>
+              <a:t>5/26/2020</a:t>
             </a:fld>
             <a:endParaRPr lang="en-US"/>
           </a:p>
@@ -2910,7 +2910,7 @@
           <a:p>
             <a:fld id="{C232E424-9F19-428C-A7B9-071E7255E85E}" type="datetimeFigureOut">
               <a:rPr lang="en-US" smtClean="0"/>
-              <a:t>5/12/2020</a:t>
+              <a:t>5/26/2020</a:t>
             </a:fld>
             <a:endParaRPr lang="en-US"/>
           </a:p>
@@ -4479,7 +4479,7 @@
         <p:spPr>
           <a:xfrm>
             <a:off x="2838450" y="4287467"/>
-            <a:ext cx="3257550" cy="1200329"/>
+            <a:ext cx="3257550" cy="923330"/>
           </a:xfrm>
           <a:prstGeom prst="rect">
             <a:avLst/>
@@ -4494,13 +4494,11 @@
           <a:p>
             <a:r>
               <a:rPr lang="en-US" dirty="0"/>
-              <a:t>Submit Order saves the new order and take you to Order History w/ the new row added (after showing “Pizza time” </a:t>
-            </a:r>
-            <a:r>
-              <a:rPr lang="en-US" dirty="0">
-                <a:sym typeface="Wingdings" panose="05000000000000000000" pitchFamily="2" charset="2"/>
-              </a:rPr>
-              <a:t>)</a:t>
+              <a:t>Submit Order saves the new order and take you to Order History w/ the new </a:t>
+            </a:r>
+            <a:r>
+              <a:rPr lang="en-US"/>
+              <a:t>row added</a:t>
             </a:r>
             <a:endParaRPr lang="en-US" dirty="0"/>
           </a:p>

</xml_diff>